<commit_message>
Updated README file, renamed attributes, fixed code comments.
</commit_message>
<xml_diff>
--- a/media/python.pptx
+++ b/media/python.pptx
@@ -105,6 +105,11 @@
       </a:defRPr>
     </a:lvl9pPr>
   </p:defaultTextStyle>
+  <p:extLst>
+    <p:ext uri="{EFAFB233-063F-42B5-8137-9DF3F51BA10A}">
+      <p15:sldGuideLst xmlns:p15="http://schemas.microsoft.com/office/powerpoint/2012/main"/>
+    </p:ext>
+  </p:extLst>
 </p:presentation>
 </file>
 
@@ -255,7 +260,7 @@
           <a:p>
             <a:fld id="{1BBE766E-B7A2-428D-9398-AB1B5B18D6BF}" type="datetimeFigureOut">
               <a:rPr lang="en-US" smtClean="0"/>
-              <a:t>6/16/2023</a:t>
+              <a:t>7/5/2023</a:t>
             </a:fld>
             <a:endParaRPr lang="en-US"/>
           </a:p>
@@ -453,7 +458,7 @@
           <a:p>
             <a:fld id="{1BBE766E-B7A2-428D-9398-AB1B5B18D6BF}" type="datetimeFigureOut">
               <a:rPr lang="en-US" smtClean="0"/>
-              <a:t>6/16/2023</a:t>
+              <a:t>7/5/2023</a:t>
             </a:fld>
             <a:endParaRPr lang="en-US"/>
           </a:p>
@@ -661,7 +666,7 @@
           <a:p>
             <a:fld id="{1BBE766E-B7A2-428D-9398-AB1B5B18D6BF}" type="datetimeFigureOut">
               <a:rPr lang="en-US" smtClean="0"/>
-              <a:t>6/16/2023</a:t>
+              <a:t>7/5/2023</a:t>
             </a:fld>
             <a:endParaRPr lang="en-US"/>
           </a:p>
@@ -859,7 +864,7 @@
           <a:p>
             <a:fld id="{1BBE766E-B7A2-428D-9398-AB1B5B18D6BF}" type="datetimeFigureOut">
               <a:rPr lang="en-US" smtClean="0"/>
-              <a:t>6/16/2023</a:t>
+              <a:t>7/5/2023</a:t>
             </a:fld>
             <a:endParaRPr lang="en-US"/>
           </a:p>
@@ -1134,7 +1139,7 @@
           <a:p>
             <a:fld id="{1BBE766E-B7A2-428D-9398-AB1B5B18D6BF}" type="datetimeFigureOut">
               <a:rPr lang="en-US" smtClean="0"/>
-              <a:t>6/16/2023</a:t>
+              <a:t>7/5/2023</a:t>
             </a:fld>
             <a:endParaRPr lang="en-US"/>
           </a:p>
@@ -1399,7 +1404,7 @@
           <a:p>
             <a:fld id="{1BBE766E-B7A2-428D-9398-AB1B5B18D6BF}" type="datetimeFigureOut">
               <a:rPr lang="en-US" smtClean="0"/>
-              <a:t>6/16/2023</a:t>
+              <a:t>7/5/2023</a:t>
             </a:fld>
             <a:endParaRPr lang="en-US"/>
           </a:p>
@@ -1811,7 +1816,7 @@
           <a:p>
             <a:fld id="{1BBE766E-B7A2-428D-9398-AB1B5B18D6BF}" type="datetimeFigureOut">
               <a:rPr lang="en-US" smtClean="0"/>
-              <a:t>6/16/2023</a:t>
+              <a:t>7/5/2023</a:t>
             </a:fld>
             <a:endParaRPr lang="en-US"/>
           </a:p>
@@ -1952,7 +1957,7 @@
           <a:p>
             <a:fld id="{1BBE766E-B7A2-428D-9398-AB1B5B18D6BF}" type="datetimeFigureOut">
               <a:rPr lang="en-US" smtClean="0"/>
-              <a:t>6/16/2023</a:t>
+              <a:t>7/5/2023</a:t>
             </a:fld>
             <a:endParaRPr lang="en-US"/>
           </a:p>
@@ -2065,7 +2070,7 @@
           <a:p>
             <a:fld id="{1BBE766E-B7A2-428D-9398-AB1B5B18D6BF}" type="datetimeFigureOut">
               <a:rPr lang="en-US" smtClean="0"/>
-              <a:t>6/16/2023</a:t>
+              <a:t>7/5/2023</a:t>
             </a:fld>
             <a:endParaRPr lang="en-US"/>
           </a:p>
@@ -2376,7 +2381,7 @@
           <a:p>
             <a:fld id="{1BBE766E-B7A2-428D-9398-AB1B5B18D6BF}" type="datetimeFigureOut">
               <a:rPr lang="en-US" smtClean="0"/>
-              <a:t>6/16/2023</a:t>
+              <a:t>7/5/2023</a:t>
             </a:fld>
             <a:endParaRPr lang="en-US"/>
           </a:p>
@@ -2664,7 +2669,7 @@
           <a:p>
             <a:fld id="{1BBE766E-B7A2-428D-9398-AB1B5B18D6BF}" type="datetimeFigureOut">
               <a:rPr lang="en-US" smtClean="0"/>
-              <a:t>6/16/2023</a:t>
+              <a:t>7/5/2023</a:t>
             </a:fld>
             <a:endParaRPr lang="en-US"/>
           </a:p>
@@ -2905,7 +2910,7 @@
           <a:p>
             <a:fld id="{1BBE766E-B7A2-428D-9398-AB1B5B18D6BF}" type="datetimeFigureOut">
               <a:rPr lang="en-US" smtClean="0"/>
-              <a:t>6/16/2023</a:t>
+              <a:t>7/5/2023</a:t>
             </a:fld>
             <a:endParaRPr lang="en-US"/>
           </a:p>
@@ -3343,7 +3348,10 @@
           <a:bodyPr/>
           <a:lstStyle/>
           <a:p>
-            <a:endParaRPr lang="en-US"/>
+            <a:r>
+              <a:rPr lang="en-US" dirty="0"/>
+              <a:t>Python </a:t>
+            </a:r>
           </a:p>
         </p:txBody>
       </p:sp>
@@ -3368,7 +3376,10 @@
           <a:bodyPr/>
           <a:lstStyle/>
           <a:p>
-            <a:endParaRPr lang="en-US"/>
+            <a:r>
+              <a:rPr lang="en-US" dirty="0"/>
+              <a:t>Media support</a:t>
+            </a:r>
           </a:p>
         </p:txBody>
       </p:sp>
@@ -3404,10 +3415,10 @@
       </p:grpSpPr>
       <p:pic>
         <p:nvPicPr>
-          <p:cNvPr id="3" name="Picture 2">
-            <a:extLst>
-              <a:ext uri="{FF2B5EF4-FFF2-40B4-BE49-F238E27FC236}">
-                <a16:creationId xmlns:a16="http://schemas.microsoft.com/office/drawing/2014/main" id="{846FE073-6414-2C65-5A09-5ED282296E83}"/>
+          <p:cNvPr id="4" name="Picture 3">
+            <a:extLst>
+              <a:ext uri="{FF2B5EF4-FFF2-40B4-BE49-F238E27FC236}">
+                <a16:creationId xmlns:a16="http://schemas.microsoft.com/office/drawing/2014/main" id="{E5EFC97C-37CF-A2DC-1BD7-0E8A4269EA16}"/>
               </a:ext>
             </a:extLst>
           </p:cNvPr>
@@ -3424,8 +3435,8 @@
         </p:blipFill>
         <p:spPr>
           <a:xfrm>
-            <a:off x="1183413" y="886785"/>
-            <a:ext cx="3386258" cy="849735"/>
+            <a:off x="1067881" y="975011"/>
+            <a:ext cx="2660002" cy="652453"/>
           </a:xfrm>
           <a:prstGeom prst="rect">
             <a:avLst/>

</xml_diff>